<commit_message>
MODIFIED: Mockups & PPT
</commit_message>
<xml_diff>
--- a/Fase 1/Evidencias Grupales/Presentación Proyecto.pptx
+++ b/Fase 1/Evidencias Grupales/Presentación Proyecto.pptx
@@ -21,23 +21,25 @@
     <p:sldId id="266" r:id="rId16"/>
     <p:sldId id="267" r:id="rId17"/>
     <p:sldId id="268" r:id="rId18"/>
+    <p:sldId id="269" r:id="rId19"/>
+    <p:sldId id="270" r:id="rId20"/>
   </p:sldIdLst>
   <p:sldSz cy="5143500" cx="9144000"/>
   <p:notesSz cx="6858000" cy="9144000"/>
   <p:embeddedFontLst>
     <p:embeddedFont>
       <p:font typeface="Montserrat"/>
-      <p:regular r:id="rId19"/>
-      <p:bold r:id="rId20"/>
-      <p:italic r:id="rId21"/>
-      <p:boldItalic r:id="rId22"/>
+      <p:regular r:id="rId21"/>
+      <p:bold r:id="rId22"/>
+      <p:italic r:id="rId23"/>
+      <p:boldItalic r:id="rId24"/>
     </p:embeddedFont>
     <p:embeddedFont>
       <p:font typeface="Lato"/>
-      <p:regular r:id="rId23"/>
-      <p:bold r:id="rId24"/>
-      <p:italic r:id="rId25"/>
-      <p:boldItalic r:id="rId26"/>
+      <p:regular r:id="rId25"/>
+      <p:bold r:id="rId26"/>
+      <p:italic r:id="rId27"/>
+      <p:boldItalic r:id="rId28"/>
     </p:embeddedFont>
   </p:embeddedFontLst>
   <p:defaultTextStyle>
@@ -818,7 +820,7 @@
   <p:cSld>
     <p:spTree>
       <p:nvGrpSpPr>
-        <p:cNvPr id="190" name="Shape 190"/>
+        <p:cNvPr id="191" name="Shape 191"/>
         <p:cNvGrpSpPr/>
         <p:nvPr/>
       </p:nvGrpSpPr>
@@ -832,7 +834,7 @@
       </p:grpSpPr>
       <p:sp>
         <p:nvSpPr>
-          <p:cNvPr id="191" name="Google Shape;191;g37a95305bef_0_15:notes"/>
+          <p:cNvPr id="192" name="Google Shape;192;g37d4aad7abb_0_7:notes"/>
           <p:cNvSpPr/>
           <p:nvPr>
             <p:ph idx="2" type="sldImg"/>
@@ -867,7 +869,7 @@
       </p:sp>
       <p:sp>
         <p:nvSpPr>
-          <p:cNvPr id="192" name="Google Shape;192;g37a95305bef_0_15:notes"/>
+          <p:cNvPr id="193" name="Google Shape;193;g37d4aad7abb_0_7:notes"/>
           <p:cNvSpPr txBox="1"/>
           <p:nvPr>
             <p:ph idx="1" type="body"/>
@@ -917,7 +919,7 @@
   <p:cSld>
     <p:spTree>
       <p:nvGrpSpPr>
-        <p:cNvPr id="196" name="Shape 196"/>
+        <p:cNvPr id="198" name="Shape 198"/>
         <p:cNvGrpSpPr/>
         <p:nvPr/>
       </p:nvGrpSpPr>
@@ -931,7 +933,7 @@
       </p:grpSpPr>
       <p:sp>
         <p:nvSpPr>
-          <p:cNvPr id="197" name="Google Shape;197;g37a95305bef_0_25:notes"/>
+          <p:cNvPr id="199" name="Google Shape;199;g37d4aad7abb_0_13:notes"/>
           <p:cNvSpPr/>
           <p:nvPr>
             <p:ph idx="2" type="sldImg"/>
@@ -966,7 +968,7 @@
       </p:sp>
       <p:sp>
         <p:nvSpPr>
-          <p:cNvPr id="198" name="Google Shape;198;g37a95305bef_0_25:notes"/>
+          <p:cNvPr id="200" name="Google Shape;200;g37d4aad7abb_0_13:notes"/>
           <p:cNvSpPr txBox="1"/>
           <p:nvPr>
             <p:ph idx="1" type="body"/>
@@ -1016,7 +1018,7 @@
   <p:cSld>
     <p:spTree>
       <p:nvGrpSpPr>
-        <p:cNvPr id="202" name="Shape 202"/>
+        <p:cNvPr id="205" name="Shape 205"/>
         <p:cNvGrpSpPr/>
         <p:nvPr/>
       </p:nvGrpSpPr>
@@ -1030,7 +1032,7 @@
       </p:grpSpPr>
       <p:sp>
         <p:nvSpPr>
-          <p:cNvPr id="203" name="Google Shape;203;g37a95305bef_0_20:notes"/>
+          <p:cNvPr id="206" name="Google Shape;206;g37a95305bef_0_10:notes"/>
           <p:cNvSpPr/>
           <p:nvPr>
             <p:ph idx="2" type="sldImg"/>
@@ -1065,7 +1067,7 @@
       </p:sp>
       <p:sp>
         <p:nvSpPr>
-          <p:cNvPr id="204" name="Google Shape;204;g37a95305bef_0_20:notes"/>
+          <p:cNvPr id="207" name="Google Shape;207;g37a95305bef_0_10:notes"/>
           <p:cNvSpPr txBox="1"/>
           <p:nvPr>
             <p:ph idx="1" type="body"/>
@@ -1115,7 +1117,7 @@
   <p:cSld>
     <p:spTree>
       <p:nvGrpSpPr>
-        <p:cNvPr id="210" name="Shape 210"/>
+        <p:cNvPr id="212" name="Shape 212"/>
         <p:cNvGrpSpPr/>
         <p:nvPr/>
       </p:nvGrpSpPr>
@@ -1129,7 +1131,7 @@
       </p:grpSpPr>
       <p:sp>
         <p:nvSpPr>
-          <p:cNvPr id="211" name="Google Shape;211;g37a95305bef_0_30:notes"/>
+          <p:cNvPr id="213" name="Google Shape;213;g37a95305bef_0_25:notes"/>
           <p:cNvSpPr/>
           <p:nvPr>
             <p:ph idx="2" type="sldImg"/>
@@ -1164,7 +1166,205 @@
       </p:sp>
       <p:sp>
         <p:nvSpPr>
-          <p:cNvPr id="212" name="Google Shape;212;g37a95305bef_0_30:notes"/>
+          <p:cNvPr id="214" name="Google Shape;214;g37a95305bef_0_25:notes"/>
+          <p:cNvSpPr txBox="1"/>
+          <p:nvPr>
+            <p:ph idx="1" type="body"/>
+          </p:nvPr>
+        </p:nvSpPr>
+        <p:spPr>
+          <a:xfrm>
+            <a:off x="685800" y="4343400"/>
+            <a:ext cx="5486400" cy="4114800"/>
+          </a:xfrm>
+          <a:prstGeom prst="rect">
+            <a:avLst/>
+          </a:prstGeom>
+        </p:spPr>
+        <p:txBody>
+          <a:bodyPr anchorCtr="0" anchor="t" bIns="91425" lIns="91425" spcFirstLastPara="1" rIns="91425" wrap="square" tIns="91425">
+            <a:noAutofit/>
+          </a:bodyPr>
+          <a:lstStyle/>
+          <a:p>
+            <a:pPr indent="0" lvl="0" marL="0" rtl="0" algn="l">
+              <a:spcBef>
+                <a:spcPts val="0"/>
+              </a:spcBef>
+              <a:spcAft>
+                <a:spcPts val="0"/>
+              </a:spcAft>
+              <a:buNone/>
+            </a:pPr>
+            <a:r>
+              <a:t/>
+            </a:r>
+            <a:endParaRPr/>
+          </a:p>
+        </p:txBody>
+      </p:sp>
+    </p:spTree>
+  </p:cSld>
+  <p:clrMapOvr>
+    <a:masterClrMapping/>
+  </p:clrMapOvr>
+</p:notes>
+</file>
+
+<file path=ppt/notesSlides/notesSlide14.xml><?xml version="1.0" encoding="utf-8"?>
+<p:notes xmlns:a="http://schemas.openxmlformats.org/drawingml/2006/main" xmlns:r="http://schemas.openxmlformats.org/officeDocument/2006/relationships" xmlns:mc="http://schemas.openxmlformats.org/markup-compatibility/2006" xmlns:mv="urn:schemas-microsoft-com:mac:vml" xmlns:p="http://schemas.openxmlformats.org/presentationml/2006/main" xmlns:c="http://schemas.openxmlformats.org/drawingml/2006/chart" xmlns:dgm="http://schemas.openxmlformats.org/drawingml/2006/diagram" xmlns:o="urn:schemas-microsoft-com:office:office" xmlns:v="urn:schemas-microsoft-com:vml" xmlns:pvml="urn:schemas-microsoft-com:office:powerpoint" xmlns:com="http://schemas.openxmlformats.org/drawingml/2006/compatibility" xmlns:p14="http://schemas.microsoft.com/office/powerpoint/2010/main" xmlns:p15="http://schemas.microsoft.com/office/powerpoint/2012/main" xmlns:ahyp="http://schemas.microsoft.com/office/drawing/2018/hyperlinkcolor" showMasterPhAnim="0" showMasterSp="0">
+  <p:cSld>
+    <p:spTree>
+      <p:nvGrpSpPr>
+        <p:cNvPr id="218" name="Shape 218"/>
+        <p:cNvGrpSpPr/>
+        <p:nvPr/>
+      </p:nvGrpSpPr>
+      <p:grpSpPr>
+        <a:xfrm>
+          <a:off x="0" y="0"/>
+          <a:ext cx="0" cy="0"/>
+          <a:chOff x="0" y="0"/>
+          <a:chExt cx="0" cy="0"/>
+        </a:xfrm>
+      </p:grpSpPr>
+      <p:sp>
+        <p:nvSpPr>
+          <p:cNvPr id="219" name="Google Shape;219;g37a95305bef_0_20:notes"/>
+          <p:cNvSpPr/>
+          <p:nvPr>
+            <p:ph idx="2" type="sldImg"/>
+          </p:nvPr>
+        </p:nvSpPr>
+        <p:spPr>
+          <a:xfrm>
+            <a:off x="381300" y="685800"/>
+            <a:ext cx="6096000" cy="3429000"/>
+          </a:xfrm>
+          <a:custGeom>
+            <a:rect b="b" l="l" r="r" t="t"/>
+            <a:pathLst>
+              <a:path extrusionOk="0" h="120000" w="120000">
+                <a:moveTo>
+                  <a:pt x="0" y="0"/>
+                </a:moveTo>
+                <a:lnTo>
+                  <a:pt x="120000" y="0"/>
+                </a:lnTo>
+                <a:lnTo>
+                  <a:pt x="120000" y="120000"/>
+                </a:lnTo>
+                <a:lnTo>
+                  <a:pt x="0" y="120000"/>
+                </a:lnTo>
+                <a:close/>
+              </a:path>
+            </a:pathLst>
+          </a:custGeom>
+        </p:spPr>
+      </p:sp>
+      <p:sp>
+        <p:nvSpPr>
+          <p:cNvPr id="220" name="Google Shape;220;g37a95305bef_0_20:notes"/>
+          <p:cNvSpPr txBox="1"/>
+          <p:nvPr>
+            <p:ph idx="1" type="body"/>
+          </p:nvPr>
+        </p:nvSpPr>
+        <p:spPr>
+          <a:xfrm>
+            <a:off x="685800" y="4343400"/>
+            <a:ext cx="5486400" cy="4114800"/>
+          </a:xfrm>
+          <a:prstGeom prst="rect">
+            <a:avLst/>
+          </a:prstGeom>
+        </p:spPr>
+        <p:txBody>
+          <a:bodyPr anchorCtr="0" anchor="t" bIns="91425" lIns="91425" spcFirstLastPara="1" rIns="91425" wrap="square" tIns="91425">
+            <a:noAutofit/>
+          </a:bodyPr>
+          <a:lstStyle/>
+          <a:p>
+            <a:pPr indent="0" lvl="0" marL="0" rtl="0" algn="l">
+              <a:spcBef>
+                <a:spcPts val="0"/>
+              </a:spcBef>
+              <a:spcAft>
+                <a:spcPts val="0"/>
+              </a:spcAft>
+              <a:buNone/>
+            </a:pPr>
+            <a:r>
+              <a:t/>
+            </a:r>
+            <a:endParaRPr/>
+          </a:p>
+        </p:txBody>
+      </p:sp>
+    </p:spTree>
+  </p:cSld>
+  <p:clrMapOvr>
+    <a:masterClrMapping/>
+  </p:clrMapOvr>
+</p:notes>
+</file>
+
+<file path=ppt/notesSlides/notesSlide15.xml><?xml version="1.0" encoding="utf-8"?>
+<p:notes xmlns:a="http://schemas.openxmlformats.org/drawingml/2006/main" xmlns:r="http://schemas.openxmlformats.org/officeDocument/2006/relationships" xmlns:mc="http://schemas.openxmlformats.org/markup-compatibility/2006" xmlns:mv="urn:schemas-microsoft-com:mac:vml" xmlns:p="http://schemas.openxmlformats.org/presentationml/2006/main" xmlns:c="http://schemas.openxmlformats.org/drawingml/2006/chart" xmlns:dgm="http://schemas.openxmlformats.org/drawingml/2006/diagram" xmlns:o="urn:schemas-microsoft-com:office:office" xmlns:v="urn:schemas-microsoft-com:vml" xmlns:pvml="urn:schemas-microsoft-com:office:powerpoint" xmlns:com="http://schemas.openxmlformats.org/drawingml/2006/compatibility" xmlns:p14="http://schemas.microsoft.com/office/powerpoint/2010/main" xmlns:p15="http://schemas.microsoft.com/office/powerpoint/2012/main" xmlns:ahyp="http://schemas.microsoft.com/office/drawing/2018/hyperlinkcolor" showMasterPhAnim="0" showMasterSp="0">
+  <p:cSld>
+    <p:spTree>
+      <p:nvGrpSpPr>
+        <p:cNvPr id="225" name="Shape 225"/>
+        <p:cNvGrpSpPr/>
+        <p:nvPr/>
+      </p:nvGrpSpPr>
+      <p:grpSpPr>
+        <a:xfrm>
+          <a:off x="0" y="0"/>
+          <a:ext cx="0" cy="0"/>
+          <a:chOff x="0" y="0"/>
+          <a:chExt cx="0" cy="0"/>
+        </a:xfrm>
+      </p:grpSpPr>
+      <p:sp>
+        <p:nvSpPr>
+          <p:cNvPr id="226" name="Google Shape;226;g37a95305bef_0_30:notes"/>
+          <p:cNvSpPr/>
+          <p:nvPr>
+            <p:ph idx="2" type="sldImg"/>
+          </p:nvPr>
+        </p:nvSpPr>
+        <p:spPr>
+          <a:xfrm>
+            <a:off x="381300" y="685800"/>
+            <a:ext cx="6096000" cy="3429000"/>
+          </a:xfrm>
+          <a:custGeom>
+            <a:rect b="b" l="l" r="r" t="t"/>
+            <a:pathLst>
+              <a:path extrusionOk="0" h="120000" w="120000">
+                <a:moveTo>
+                  <a:pt x="0" y="0"/>
+                </a:moveTo>
+                <a:lnTo>
+                  <a:pt x="120000" y="0"/>
+                </a:lnTo>
+                <a:lnTo>
+                  <a:pt x="120000" y="120000"/>
+                </a:lnTo>
+                <a:lnTo>
+                  <a:pt x="0" y="120000"/>
+                </a:lnTo>
+                <a:close/>
+              </a:path>
+            </a:pathLst>
+          </a:custGeom>
+        </p:spPr>
+      </p:sp>
+      <p:sp>
+        <p:nvSpPr>
+          <p:cNvPr id="227" name="Google Shape;227;g37a95305bef_0_30:notes"/>
           <p:cNvSpPr txBox="1"/>
           <p:nvPr>
             <p:ph idx="1" type="body"/>
@@ -1907,7 +2107,7 @@
   <p:cSld>
     <p:spTree>
       <p:nvGrpSpPr>
-        <p:cNvPr id="183" name="Shape 183"/>
+        <p:cNvPr id="184" name="Shape 184"/>
         <p:cNvGrpSpPr/>
         <p:nvPr/>
       </p:nvGrpSpPr>
@@ -1921,7 +2121,7 @@
       </p:grpSpPr>
       <p:sp>
         <p:nvSpPr>
-          <p:cNvPr id="184" name="Google Shape;184;g37a95305bef_0_10:notes"/>
+          <p:cNvPr id="185" name="Google Shape;185;g37d4aad7abb_0_1:notes"/>
           <p:cNvSpPr/>
           <p:nvPr>
             <p:ph idx="2" type="sldImg"/>
@@ -1956,7 +2156,7 @@
       </p:sp>
       <p:sp>
         <p:nvSpPr>
-          <p:cNvPr id="185" name="Google Shape;185;g37a95305bef_0_10:notes"/>
+          <p:cNvPr id="186" name="Google Shape;186;g37d4aad7abb_0_1:notes"/>
           <p:cNvSpPr txBox="1"/>
           <p:nvPr>
             <p:ph idx="1" type="body"/>
@@ -10523,7 +10723,7 @@
   <p:cSld>
     <p:spTree>
       <p:nvGrpSpPr>
-        <p:cNvPr id="193" name="Shape 193"/>
+        <p:cNvPr id="194" name="Shape 194"/>
         <p:cNvGrpSpPr/>
         <p:nvPr/>
       </p:nvGrpSpPr>
@@ -10537,7 +10737,7 @@
       </p:grpSpPr>
       <p:sp>
         <p:nvSpPr>
-          <p:cNvPr id="194" name="Google Shape;194;p22"/>
+          <p:cNvPr id="195" name="Google Shape;195;p22"/>
           <p:cNvSpPr txBox="1"/>
           <p:nvPr>
             <p:ph type="title"/>
@@ -10569,7 +10769,22 @@
             </a:pPr>
             <a:r>
               <a:rPr lang="es"/>
-              <a:t>Planificación Responsabilidades - Matriz RACI</a:t>
+              <a:t>Diseño del sistema - Diagrama Actividades</a:t>
+            </a:r>
+            <a:endParaRPr/>
+          </a:p>
+          <a:p>
+            <a:pPr indent="0" lvl="0" marL="0" rtl="0" algn="l">
+              <a:spcBef>
+                <a:spcPts val="0"/>
+              </a:spcBef>
+              <a:spcAft>
+                <a:spcPts val="0"/>
+              </a:spcAft>
+              <a:buNone/>
+            </a:pPr>
+            <a:r>
+              <a:t/>
             </a:r>
             <a:endParaRPr/>
           </a:p>
@@ -10577,7 +10792,7 @@
       </p:sp>
       <p:sp>
         <p:nvSpPr>
-          <p:cNvPr id="195" name="Google Shape;195;p22"/>
+          <p:cNvPr id="196" name="Google Shape;196;p22"/>
           <p:cNvSpPr txBox="1"/>
           <p:nvPr>
             <p:ph idx="1" type="body"/>
@@ -10614,6 +10829,34 @@
           </a:p>
         </p:txBody>
       </p:sp>
+      <p:pic>
+        <p:nvPicPr>
+          <p:cNvPr id="197" name="Google Shape;197;p22" title="Consulta de memorial digital mediante QR.png"/>
+          <p:cNvPicPr preferRelativeResize="0"/>
+          <p:nvPr/>
+        </p:nvPicPr>
+        <p:blipFill>
+          <a:blip r:embed="rId3">
+            <a:alphaModFix/>
+          </a:blip>
+          <a:stretch>
+            <a:fillRect/>
+          </a:stretch>
+        </p:blipFill>
+        <p:spPr>
+          <a:xfrm>
+            <a:off x="1074275" y="909075"/>
+            <a:ext cx="7262125" cy="4177451"/>
+          </a:xfrm>
+          <a:prstGeom prst="rect">
+            <a:avLst/>
+          </a:prstGeom>
+          <a:noFill/>
+          <a:ln>
+            <a:noFill/>
+          </a:ln>
+        </p:spPr>
+      </p:pic>
     </p:spTree>
   </p:cSld>
   <p:clrMapOvr>
@@ -10627,7 +10870,7 @@
   <p:cSld>
     <p:spTree>
       <p:nvGrpSpPr>
-        <p:cNvPr id="199" name="Shape 199"/>
+        <p:cNvPr id="201" name="Shape 201"/>
         <p:cNvGrpSpPr/>
         <p:nvPr/>
       </p:nvGrpSpPr>
@@ -10641,7 +10884,7 @@
       </p:grpSpPr>
       <p:sp>
         <p:nvSpPr>
-          <p:cNvPr id="200" name="Google Shape;200;p23"/>
+          <p:cNvPr id="202" name="Google Shape;202;p23"/>
           <p:cNvSpPr txBox="1"/>
           <p:nvPr>
             <p:ph type="title"/>
@@ -10672,16 +10915,7 @@
               <a:buNone/>
             </a:pPr>
             <a:r>
-              <a:rPr lang="es"/>
-              <a:t>Planificación - </a:t>
-            </a:r>
-            <a:r>
-              <a:rPr lang="es"/>
-              <a:t>Estimación</a:t>
-            </a:r>
-            <a:r>
-              <a:rPr lang="es"/>
-              <a:t> de Riesgos</a:t>
+              <a:t/>
             </a:r>
             <a:endParaRPr/>
           </a:p>
@@ -10689,7 +10923,7 @@
       </p:sp>
       <p:sp>
         <p:nvSpPr>
-          <p:cNvPr id="201" name="Google Shape;201;p23"/>
+          <p:cNvPr id="203" name="Google Shape;203;p23"/>
           <p:cNvSpPr txBox="1"/>
           <p:nvPr>
             <p:ph idx="1" type="body"/>
@@ -10726,6 +10960,34 @@
           </a:p>
         </p:txBody>
       </p:sp>
+      <p:pic>
+        <p:nvPicPr>
+          <p:cNvPr id="204" name="Google Shape;204;p23" title="Compra en el marketplace funerario.png"/>
+          <p:cNvPicPr preferRelativeResize="0"/>
+          <p:nvPr/>
+        </p:nvPicPr>
+        <p:blipFill>
+          <a:blip r:embed="rId3">
+            <a:alphaModFix/>
+          </a:blip>
+          <a:stretch>
+            <a:fillRect/>
+          </a:stretch>
+        </p:blipFill>
+        <p:spPr>
+          <a:xfrm>
+            <a:off x="48825" y="89525"/>
+            <a:ext cx="9095174" cy="5143501"/>
+          </a:xfrm>
+          <a:prstGeom prst="rect">
+            <a:avLst/>
+          </a:prstGeom>
+          <a:noFill/>
+          <a:ln>
+            <a:noFill/>
+          </a:ln>
+        </p:spPr>
+      </p:pic>
     </p:spTree>
   </p:cSld>
   <p:clrMapOvr>
@@ -10739,7 +11001,7 @@
   <p:cSld>
     <p:spTree>
       <p:nvGrpSpPr>
-        <p:cNvPr id="205" name="Shape 205"/>
+        <p:cNvPr id="208" name="Shape 208"/>
         <p:cNvGrpSpPr/>
         <p:nvPr/>
       </p:nvGrpSpPr>
@@ -10753,7 +11015,7 @@
       </p:grpSpPr>
       <p:sp>
         <p:nvSpPr>
-          <p:cNvPr id="206" name="Google Shape;206;p24"/>
+          <p:cNvPr id="209" name="Google Shape;209;p24"/>
           <p:cNvSpPr txBox="1"/>
           <p:nvPr>
             <p:ph type="title"/>
@@ -10785,7 +11047,7 @@
             </a:pPr>
             <a:r>
               <a:rPr lang="es"/>
-              <a:t>Planificación - Carta Gantt</a:t>
+              <a:t>Tecnologías de Desarrollo</a:t>
             </a:r>
             <a:endParaRPr/>
           </a:p>
@@ -10793,7 +11055,7 @@
       </p:sp>
       <p:sp>
         <p:nvSpPr>
-          <p:cNvPr id="207" name="Google Shape;207;p24"/>
+          <p:cNvPr id="210" name="Google Shape;210;p24"/>
           <p:cNvSpPr txBox="1"/>
           <p:nvPr>
             <p:ph idx="1" type="body"/>
@@ -10801,8 +11063,192 @@
         </p:nvSpPr>
         <p:spPr>
           <a:xfrm>
-            <a:off x="1297500" y="3883750"/>
-            <a:ext cx="7038900" cy="594900"/>
+            <a:off x="1297500" y="1567550"/>
+            <a:ext cx="2171700" cy="2911200"/>
+          </a:xfrm>
+          <a:prstGeom prst="rect">
+            <a:avLst/>
+          </a:prstGeom>
+        </p:spPr>
+        <p:txBody>
+          <a:bodyPr anchorCtr="0" anchor="t" bIns="91425" lIns="91425" spcFirstLastPara="1" rIns="91425" wrap="square" tIns="91425">
+            <a:normAutofit lnSpcReduction="10000"/>
+          </a:bodyPr>
+          <a:lstStyle/>
+          <a:p>
+            <a:pPr indent="0" lvl="0" marL="0" rtl="0" algn="l">
+              <a:spcBef>
+                <a:spcPts val="0"/>
+              </a:spcBef>
+              <a:spcAft>
+                <a:spcPts val="0"/>
+              </a:spcAft>
+              <a:buNone/>
+            </a:pPr>
+            <a:r>
+              <a:rPr lang="es"/>
+              <a:t>Frontend:</a:t>
+            </a:r>
+            <a:endParaRPr/>
+          </a:p>
+          <a:p>
+            <a:pPr indent="-311150" lvl="0" marL="457200" rtl="0" algn="l">
+              <a:spcBef>
+                <a:spcPts val="1200"/>
+              </a:spcBef>
+              <a:spcAft>
+                <a:spcPts val="0"/>
+              </a:spcAft>
+              <a:buSzPts val="1300"/>
+              <a:buChar char="-"/>
+            </a:pPr>
+            <a:r>
+              <a:rPr lang="es"/>
+              <a:t>Angular v20</a:t>
+            </a:r>
+            <a:endParaRPr/>
+          </a:p>
+          <a:p>
+            <a:pPr indent="-311150" lvl="0" marL="457200" rtl="0" algn="l">
+              <a:spcBef>
+                <a:spcPts val="0"/>
+              </a:spcBef>
+              <a:spcAft>
+                <a:spcPts val="0"/>
+              </a:spcAft>
+              <a:buSzPts val="1300"/>
+              <a:buChar char="-"/>
+            </a:pPr>
+            <a:r>
+              <a:rPr lang="es"/>
+              <a:t>Tailwind Css</a:t>
+            </a:r>
+            <a:endParaRPr/>
+          </a:p>
+          <a:p>
+            <a:pPr indent="0" lvl="0" marL="0" rtl="0" algn="l">
+              <a:spcBef>
+                <a:spcPts val="1200"/>
+              </a:spcBef>
+              <a:spcAft>
+                <a:spcPts val="0"/>
+              </a:spcAft>
+              <a:buNone/>
+            </a:pPr>
+            <a:r>
+              <a:rPr lang="es"/>
+              <a:t>Backend:</a:t>
+            </a:r>
+            <a:endParaRPr/>
+          </a:p>
+          <a:p>
+            <a:pPr indent="-311150" lvl="0" marL="457200" rtl="0" algn="l">
+              <a:spcBef>
+                <a:spcPts val="1200"/>
+              </a:spcBef>
+              <a:spcAft>
+                <a:spcPts val="0"/>
+              </a:spcAft>
+              <a:buSzPts val="1300"/>
+              <a:buChar char="-"/>
+            </a:pPr>
+            <a:r>
+              <a:rPr lang="es" u="sng">
+                <a:solidFill>
+                  <a:schemeClr val="hlink"/>
+                </a:solidFill>
+                <a:hlinkClick r:id="rId3"/>
+              </a:rPr>
+              <a:t>Node.js</a:t>
+            </a:r>
+            <a:endParaRPr/>
+          </a:p>
+          <a:p>
+            <a:pPr indent="-311150" lvl="0" marL="457200" rtl="0" algn="l">
+              <a:spcBef>
+                <a:spcPts val="0"/>
+              </a:spcBef>
+              <a:spcAft>
+                <a:spcPts val="0"/>
+              </a:spcAft>
+              <a:buSzPts val="1300"/>
+              <a:buChar char="-"/>
+            </a:pPr>
+            <a:r>
+              <a:rPr lang="es" u="sng">
+                <a:solidFill>
+                  <a:schemeClr val="hlink"/>
+                </a:solidFill>
+                <a:hlinkClick r:id="rId4"/>
+              </a:rPr>
+              <a:t>Express.js</a:t>
+            </a:r>
+            <a:endParaRPr/>
+          </a:p>
+          <a:p>
+            <a:pPr indent="-311150" lvl="0" marL="457200" rtl="0" algn="l">
+              <a:spcBef>
+                <a:spcPts val="0"/>
+              </a:spcBef>
+              <a:spcAft>
+                <a:spcPts val="0"/>
+              </a:spcAft>
+              <a:buSzPts val="1300"/>
+              <a:buChar char="-"/>
+            </a:pPr>
+            <a:r>
+              <a:rPr lang="es"/>
+              <a:t>Prisma</a:t>
+            </a:r>
+            <a:endParaRPr/>
+          </a:p>
+          <a:p>
+            <a:pPr indent="0" lvl="0" marL="0" rtl="0" algn="l">
+              <a:spcBef>
+                <a:spcPts val="1200"/>
+              </a:spcBef>
+              <a:spcAft>
+                <a:spcPts val="0"/>
+              </a:spcAft>
+              <a:buNone/>
+            </a:pPr>
+            <a:r>
+              <a:rPr lang="es"/>
+              <a:t>Bases de datos:</a:t>
+            </a:r>
+            <a:endParaRPr/>
+          </a:p>
+          <a:p>
+            <a:pPr indent="-311150" lvl="0" marL="457200" rtl="0" algn="l">
+              <a:spcBef>
+                <a:spcPts val="1200"/>
+              </a:spcBef>
+              <a:spcAft>
+                <a:spcPts val="0"/>
+              </a:spcAft>
+              <a:buSzPts val="1300"/>
+              <a:buChar char="-"/>
+            </a:pPr>
+            <a:r>
+              <a:rPr lang="es"/>
+              <a:t>PostgreSQL</a:t>
+            </a:r>
+            <a:endParaRPr/>
+          </a:p>
+        </p:txBody>
+      </p:sp>
+      <p:sp>
+        <p:nvSpPr>
+          <p:cNvPr id="211" name="Google Shape;211;p24"/>
+          <p:cNvSpPr txBox="1"/>
+          <p:nvPr>
+            <p:ph idx="1" type="body"/>
+          </p:nvPr>
+        </p:nvSpPr>
+        <p:spPr>
+          <a:xfrm>
+            <a:off x="4795600" y="1665625"/>
+            <a:ext cx="2171700" cy="2911200"/>
           </a:xfrm>
           <a:prstGeom prst="rect">
             <a:avLst/>
@@ -10819,83 +11265,68 @@
                 <a:spcPts val="0"/>
               </a:spcBef>
               <a:spcAft>
-                <a:spcPts val="1200"/>
+                <a:spcPts val="0"/>
               </a:spcAft>
               <a:buNone/>
             </a:pPr>
             <a:r>
               <a:rPr lang="es"/>
-              <a:t>Enlace: </a:t>
+              <a:t>Control de versionamiento</a:t>
             </a:r>
+            <a:endParaRPr/>
+          </a:p>
+          <a:p>
+            <a:pPr indent="-311150" lvl="0" marL="457200" rtl="0" algn="l">
+              <a:spcBef>
+                <a:spcPts val="1200"/>
+              </a:spcBef>
+              <a:spcAft>
+                <a:spcPts val="0"/>
+              </a:spcAft>
+              <a:buSzPts val="1300"/>
+              <a:buChar char="-"/>
+            </a:pPr>
             <a:r>
-              <a:rPr lang="es" u="sng">
-                <a:solidFill>
-                  <a:schemeClr val="hlink"/>
-                </a:solidFill>
-                <a:hlinkClick r:id="rId3"/>
-              </a:rPr>
-              <a:t>Carta Gantt</a:t>
+              <a:rPr lang="es"/>
+              <a:t>Git &amp; GitHub</a:t>
+            </a:r>
+            <a:endParaRPr/>
+          </a:p>
+          <a:p>
+            <a:pPr indent="0" lvl="0" marL="0" rtl="0" algn="l">
+              <a:spcBef>
+                <a:spcPts val="1200"/>
+              </a:spcBef>
+              <a:spcAft>
+                <a:spcPts val="0"/>
+              </a:spcAft>
+              <a:buNone/>
+            </a:pPr>
+            <a:r>
+              <a:rPr lang="es"/>
+              <a:t>Cloud:</a:t>
+            </a:r>
+            <a:endParaRPr/>
+          </a:p>
+          <a:p>
+            <a:pPr indent="-311150" lvl="0" marL="457200" rtl="0" algn="l">
+              <a:spcBef>
+                <a:spcPts val="1200"/>
+              </a:spcBef>
+              <a:spcAft>
+                <a:spcPts val="0"/>
+              </a:spcAft>
+              <a:buSzPts val="1300"/>
+              <a:buChar char="-"/>
+            </a:pPr>
+            <a:r>
+              <a:rPr lang="es"/>
+              <a:t>Google Cloud Platform</a:t>
             </a:r>
             <a:endParaRPr/>
           </a:p>
         </p:txBody>
       </p:sp>
-      <p:pic>
-        <p:nvPicPr>
-          <p:cNvPr id="208" name="Google Shape;208;p24"/>
-          <p:cNvPicPr preferRelativeResize="0"/>
-          <p:nvPr/>
-        </p:nvPicPr>
-        <p:blipFill>
-          <a:blip r:embed="rId4">
-            <a:alphaModFix/>
-          </a:blip>
-          <a:stretch>
-            <a:fillRect/>
-          </a:stretch>
-        </p:blipFill>
-        <p:spPr>
-          <a:xfrm>
-            <a:off x="394300" y="1367575"/>
-            <a:ext cx="4177700" cy="2249400"/>
-          </a:xfrm>
-          <a:prstGeom prst="rect">
-            <a:avLst/>
-          </a:prstGeom>
-          <a:noFill/>
-          <a:ln>
-            <a:noFill/>
-          </a:ln>
-        </p:spPr>
-      </p:pic>
-      <p:pic>
-        <p:nvPicPr>
-          <p:cNvPr id="209" name="Google Shape;209;p24"/>
-          <p:cNvPicPr preferRelativeResize="0"/>
-          <p:nvPr/>
-        </p:nvPicPr>
-        <p:blipFill>
-          <a:blip r:embed="rId5">
-            <a:alphaModFix/>
-          </a:blip>
-          <a:stretch>
-            <a:fillRect/>
-          </a:stretch>
-        </p:blipFill>
-        <p:spPr>
-          <a:xfrm>
-            <a:off x="4572000" y="1367575"/>
-            <a:ext cx="4177699" cy="2249400"/>
-          </a:xfrm>
-          <a:prstGeom prst="rect">
-            <a:avLst/>
-          </a:prstGeom>
-          <a:noFill/>
-          <a:ln>
-            <a:noFill/>
-          </a:ln>
-        </p:spPr>
-      </p:pic>
     </p:spTree>
   </p:cSld>
   <p:clrMapOvr>
@@ -10909,7 +11340,7 @@
   <p:cSld>
     <p:spTree>
       <p:nvGrpSpPr>
-        <p:cNvPr id="213" name="Shape 213"/>
+        <p:cNvPr id="215" name="Shape 215"/>
         <p:cNvGrpSpPr/>
         <p:nvPr/>
       </p:nvGrpSpPr>
@@ -10923,7 +11354,7 @@
       </p:grpSpPr>
       <p:sp>
         <p:nvSpPr>
-          <p:cNvPr id="214" name="Google Shape;214;p25"/>
+          <p:cNvPr id="216" name="Google Shape;216;p25"/>
           <p:cNvSpPr txBox="1"/>
           <p:nvPr>
             <p:ph type="title"/>
@@ -10955,6 +11386,260 @@
             </a:pPr>
             <a:r>
               <a:rPr lang="es"/>
+              <a:t>Planificación - </a:t>
+            </a:r>
+            <a:r>
+              <a:rPr lang="es"/>
+              <a:t>Estimación</a:t>
+            </a:r>
+            <a:r>
+              <a:rPr lang="es"/>
+              <a:t> de Riesgos</a:t>
+            </a:r>
+            <a:endParaRPr/>
+          </a:p>
+        </p:txBody>
+      </p:sp>
+      <p:sp>
+        <p:nvSpPr>
+          <p:cNvPr id="217" name="Google Shape;217;p25"/>
+          <p:cNvSpPr txBox="1"/>
+          <p:nvPr>
+            <p:ph idx="1" type="body"/>
+          </p:nvPr>
+        </p:nvSpPr>
+        <p:spPr>
+          <a:xfrm>
+            <a:off x="1297500" y="1567550"/>
+            <a:ext cx="7038900" cy="2911200"/>
+          </a:xfrm>
+          <a:prstGeom prst="rect">
+            <a:avLst/>
+          </a:prstGeom>
+        </p:spPr>
+        <p:txBody>
+          <a:bodyPr anchorCtr="0" anchor="t" bIns="91425" lIns="91425" spcFirstLastPara="1" rIns="91425" wrap="square" tIns="91425">
+            <a:normAutofit/>
+          </a:bodyPr>
+          <a:lstStyle/>
+          <a:p>
+            <a:pPr indent="0" lvl="0" marL="0" rtl="0" algn="l">
+              <a:spcBef>
+                <a:spcPts val="0"/>
+              </a:spcBef>
+              <a:spcAft>
+                <a:spcPts val="1200"/>
+              </a:spcAft>
+              <a:buNone/>
+            </a:pPr>
+            <a:r>
+              <a:t/>
+            </a:r>
+            <a:endParaRPr/>
+          </a:p>
+        </p:txBody>
+      </p:sp>
+    </p:spTree>
+  </p:cSld>
+  <p:clrMapOvr>
+    <a:masterClrMapping/>
+  </p:clrMapOvr>
+</p:sld>
+</file>
+
+<file path=ppt/slides/slide14.xml><?xml version="1.0" encoding="utf-8"?>
+<p:sld xmlns:a="http://schemas.openxmlformats.org/drawingml/2006/main" xmlns:r="http://schemas.openxmlformats.org/officeDocument/2006/relationships" xmlns:mc="http://schemas.openxmlformats.org/markup-compatibility/2006" xmlns:mv="urn:schemas-microsoft-com:mac:vml" xmlns:p="http://schemas.openxmlformats.org/presentationml/2006/main" xmlns:c="http://schemas.openxmlformats.org/drawingml/2006/chart" xmlns:dgm="http://schemas.openxmlformats.org/drawingml/2006/diagram" xmlns:o="urn:schemas-microsoft-com:office:office" xmlns:v="urn:schemas-microsoft-com:vml" xmlns:pvml="urn:schemas-microsoft-com:office:powerpoint" xmlns:com="http://schemas.openxmlformats.org/drawingml/2006/compatibility" xmlns:p14="http://schemas.microsoft.com/office/powerpoint/2010/main" xmlns:p15="http://schemas.microsoft.com/office/powerpoint/2012/main" xmlns:ahyp="http://schemas.microsoft.com/office/drawing/2018/hyperlinkcolor">
+  <p:cSld>
+    <p:spTree>
+      <p:nvGrpSpPr>
+        <p:cNvPr id="221" name="Shape 221"/>
+        <p:cNvGrpSpPr/>
+        <p:nvPr/>
+      </p:nvGrpSpPr>
+      <p:grpSpPr>
+        <a:xfrm>
+          <a:off x="0" y="0"/>
+          <a:ext cx="0" cy="0"/>
+          <a:chOff x="0" y="0"/>
+          <a:chExt cx="0" cy="0"/>
+        </a:xfrm>
+      </p:grpSpPr>
+      <p:sp>
+        <p:nvSpPr>
+          <p:cNvPr id="222" name="Google Shape;222;p26"/>
+          <p:cNvSpPr txBox="1"/>
+          <p:nvPr>
+            <p:ph type="title"/>
+          </p:nvPr>
+        </p:nvSpPr>
+        <p:spPr>
+          <a:xfrm>
+            <a:off x="1297500" y="393750"/>
+            <a:ext cx="7038900" cy="914100"/>
+          </a:xfrm>
+          <a:prstGeom prst="rect">
+            <a:avLst/>
+          </a:prstGeom>
+        </p:spPr>
+        <p:txBody>
+          <a:bodyPr anchorCtr="0" anchor="t" bIns="91425" lIns="91425" spcFirstLastPara="1" rIns="91425" wrap="square" tIns="91425">
+            <a:normAutofit/>
+          </a:bodyPr>
+          <a:lstStyle/>
+          <a:p>
+            <a:pPr indent="0" lvl="0" marL="0" rtl="0" algn="l">
+              <a:spcBef>
+                <a:spcPts val="0"/>
+              </a:spcBef>
+              <a:spcAft>
+                <a:spcPts val="0"/>
+              </a:spcAft>
+              <a:buNone/>
+            </a:pPr>
+            <a:r>
+              <a:rPr lang="es"/>
+              <a:t>Planificación - Carta Gantt</a:t>
+            </a:r>
+            <a:endParaRPr/>
+          </a:p>
+        </p:txBody>
+      </p:sp>
+      <p:sp>
+        <p:nvSpPr>
+          <p:cNvPr id="223" name="Google Shape;223;p26"/>
+          <p:cNvSpPr txBox="1"/>
+          <p:nvPr>
+            <p:ph idx="1" type="body"/>
+          </p:nvPr>
+        </p:nvSpPr>
+        <p:spPr>
+          <a:xfrm>
+            <a:off x="1297500" y="4314625"/>
+            <a:ext cx="7038900" cy="594900"/>
+          </a:xfrm>
+          <a:prstGeom prst="rect">
+            <a:avLst/>
+          </a:prstGeom>
+        </p:spPr>
+        <p:txBody>
+          <a:bodyPr anchorCtr="0" anchor="t" bIns="91425" lIns="91425" spcFirstLastPara="1" rIns="91425" wrap="square" tIns="91425">
+            <a:normAutofit/>
+          </a:bodyPr>
+          <a:lstStyle/>
+          <a:p>
+            <a:pPr indent="0" lvl="0" marL="0" rtl="0" algn="l">
+              <a:spcBef>
+                <a:spcPts val="0"/>
+              </a:spcBef>
+              <a:spcAft>
+                <a:spcPts val="1200"/>
+              </a:spcAft>
+              <a:buNone/>
+            </a:pPr>
+            <a:r>
+              <a:rPr lang="es"/>
+              <a:t>Enlace: </a:t>
+            </a:r>
+            <a:r>
+              <a:rPr lang="es" u="sng">
+                <a:solidFill>
+                  <a:schemeClr val="hlink"/>
+                </a:solidFill>
+                <a:hlinkClick r:id="rId3"/>
+              </a:rPr>
+              <a:t>Carta Gantt</a:t>
+            </a:r>
+            <a:endParaRPr/>
+          </a:p>
+        </p:txBody>
+      </p:sp>
+      <p:pic>
+        <p:nvPicPr>
+          <p:cNvPr id="224" name="Google Shape;224;p26" title="CartaGanttEsquema.png"/>
+          <p:cNvPicPr preferRelativeResize="0"/>
+          <p:nvPr/>
+        </p:nvPicPr>
+        <p:blipFill>
+          <a:blip r:embed="rId4">
+            <a:alphaModFix/>
+          </a:blip>
+          <a:stretch>
+            <a:fillRect/>
+          </a:stretch>
+        </p:blipFill>
+        <p:spPr>
+          <a:xfrm>
+            <a:off x="1041075" y="1056351"/>
+            <a:ext cx="6977989" cy="3258275"/>
+          </a:xfrm>
+          <a:prstGeom prst="rect">
+            <a:avLst/>
+          </a:prstGeom>
+          <a:noFill/>
+          <a:ln>
+            <a:noFill/>
+          </a:ln>
+        </p:spPr>
+      </p:pic>
+    </p:spTree>
+  </p:cSld>
+  <p:clrMapOvr>
+    <a:masterClrMapping/>
+  </p:clrMapOvr>
+</p:sld>
+</file>
+
+<file path=ppt/slides/slide15.xml><?xml version="1.0" encoding="utf-8"?>
+<p:sld xmlns:a="http://schemas.openxmlformats.org/drawingml/2006/main" xmlns:r="http://schemas.openxmlformats.org/officeDocument/2006/relationships" xmlns:mc="http://schemas.openxmlformats.org/markup-compatibility/2006" xmlns:mv="urn:schemas-microsoft-com:mac:vml" xmlns:p="http://schemas.openxmlformats.org/presentationml/2006/main" xmlns:c="http://schemas.openxmlformats.org/drawingml/2006/chart" xmlns:dgm="http://schemas.openxmlformats.org/drawingml/2006/diagram" xmlns:o="urn:schemas-microsoft-com:office:office" xmlns:v="urn:schemas-microsoft-com:vml" xmlns:pvml="urn:schemas-microsoft-com:office:powerpoint" xmlns:com="http://schemas.openxmlformats.org/drawingml/2006/compatibility" xmlns:p14="http://schemas.microsoft.com/office/powerpoint/2010/main" xmlns:p15="http://schemas.microsoft.com/office/powerpoint/2012/main" xmlns:ahyp="http://schemas.microsoft.com/office/drawing/2018/hyperlinkcolor">
+  <p:cSld>
+    <p:spTree>
+      <p:nvGrpSpPr>
+        <p:cNvPr id="228" name="Shape 228"/>
+        <p:cNvGrpSpPr/>
+        <p:nvPr/>
+      </p:nvGrpSpPr>
+      <p:grpSpPr>
+        <a:xfrm>
+          <a:off x="0" y="0"/>
+          <a:ext cx="0" cy="0"/>
+          <a:chOff x="0" y="0"/>
+          <a:chExt cx="0" cy="0"/>
+        </a:xfrm>
+      </p:grpSpPr>
+      <p:sp>
+        <p:nvSpPr>
+          <p:cNvPr id="229" name="Google Shape;229;p27"/>
+          <p:cNvSpPr txBox="1"/>
+          <p:nvPr>
+            <p:ph type="title"/>
+          </p:nvPr>
+        </p:nvSpPr>
+        <p:spPr>
+          <a:xfrm>
+            <a:off x="1297500" y="393750"/>
+            <a:ext cx="7038900" cy="914100"/>
+          </a:xfrm>
+          <a:prstGeom prst="rect">
+            <a:avLst/>
+          </a:prstGeom>
+        </p:spPr>
+        <p:txBody>
+          <a:bodyPr anchorCtr="0" anchor="t" bIns="91425" lIns="91425" spcFirstLastPara="1" rIns="91425" wrap="square" tIns="91425">
+            <a:normAutofit/>
+          </a:bodyPr>
+          <a:lstStyle/>
+          <a:p>
+            <a:pPr indent="0" lvl="0" marL="0" rtl="0" algn="l">
+              <a:spcBef>
+                <a:spcPts val="0"/>
+              </a:spcBef>
+              <a:spcAft>
+                <a:spcPts val="0"/>
+              </a:spcAft>
+              <a:buNone/>
+            </a:pPr>
+            <a:r>
+              <a:rPr lang="es"/>
               <a:t>Resumen de costos estimados del proyecto</a:t>
             </a:r>
             <a:endParaRPr/>
@@ -10963,7 +11648,7 @@
       </p:sp>
       <p:sp>
         <p:nvSpPr>
-          <p:cNvPr id="215" name="Google Shape;215;p25"/>
+          <p:cNvPr id="230" name="Google Shape;230;p27"/>
           <p:cNvSpPr txBox="1"/>
           <p:nvPr>
             <p:ph idx="1" type="body"/>
@@ -11878,7 +12563,7 @@
                 <a:cs typeface="Arial"/>
                 <a:sym typeface="Arial"/>
               </a:rPr>
-              <a:t>Requiere integración con pasarelas de pago (Flow, Servipag).</a:t>
+              <a:t>Requiere integración con pasarelas de pago (Flow).</a:t>
             </a:r>
             <a:endParaRPr sz="1000">
               <a:latin typeface="Arial"/>
@@ -12642,45 +13327,34 @@
           </a:p>
         </p:txBody>
       </p:sp>
-      <p:sp>
-        <p:nvSpPr>
+      <p:pic>
+        <p:nvPicPr>
           <p:cNvPr id="176" name="Google Shape;176;p19"/>
-          <p:cNvSpPr txBox="1"/>
-          <p:nvPr>
-            <p:ph idx="1" type="body"/>
-          </p:nvPr>
-        </p:nvSpPr>
+          <p:cNvPicPr preferRelativeResize="0"/>
+          <p:nvPr/>
+        </p:nvPicPr>
+        <p:blipFill>
+          <a:blip r:embed="rId3">
+            <a:alphaModFix/>
+          </a:blip>
+          <a:stretch>
+            <a:fillRect/>
+          </a:stretch>
+        </p:blipFill>
         <p:spPr>
           <a:xfrm>
-            <a:off x="1297500" y="1567550"/>
-            <a:ext cx="7038900" cy="2911200"/>
+            <a:off x="1771825" y="959375"/>
+            <a:ext cx="5390199" cy="4124326"/>
           </a:xfrm>
           <a:prstGeom prst="rect">
             <a:avLst/>
           </a:prstGeom>
+          <a:noFill/>
+          <a:ln>
+            <a:noFill/>
+          </a:ln>
         </p:spPr>
-        <p:txBody>
-          <a:bodyPr anchorCtr="0" anchor="t" bIns="91425" lIns="91425" spcFirstLastPara="1" rIns="91425" wrap="square" tIns="91425">
-            <a:normAutofit/>
-          </a:bodyPr>
-          <a:lstStyle/>
-          <a:p>
-            <a:pPr indent="0" lvl="0" marL="0" rtl="0" algn="l">
-              <a:spcBef>
-                <a:spcPts val="0"/>
-              </a:spcBef>
-              <a:spcAft>
-                <a:spcPts val="1200"/>
-              </a:spcAft>
-              <a:buNone/>
-            </a:pPr>
-            <a:r>
-              <a:t/>
-            </a:r>
-            <a:endParaRPr/>
-          </a:p>
-        </p:txBody>
-      </p:sp>
+      </p:pic>
     </p:spTree>
   </p:cSld>
   <p:clrMapOvr>
@@ -12785,6 +13459,34 @@
           </a:p>
         </p:txBody>
       </p:sp>
+      <p:pic>
+        <p:nvPicPr>
+          <p:cNvPr id="183" name="Google Shape;183;p20" title="Búsqueda y localización de tumbas.png"/>
+          <p:cNvPicPr preferRelativeResize="0"/>
+          <p:nvPr/>
+        </p:nvPicPr>
+        <p:blipFill>
+          <a:blip r:embed="rId3">
+            <a:alphaModFix/>
+          </a:blip>
+          <a:stretch>
+            <a:fillRect/>
+          </a:stretch>
+        </p:blipFill>
+        <p:spPr>
+          <a:xfrm>
+            <a:off x="740600" y="960325"/>
+            <a:ext cx="7723375" cy="4142474"/>
+          </a:xfrm>
+          <a:prstGeom prst="rect">
+            <a:avLst/>
+          </a:prstGeom>
+          <a:noFill/>
+          <a:ln>
+            <a:noFill/>
+          </a:ln>
+        </p:spPr>
+      </p:pic>
     </p:spTree>
   </p:cSld>
   <p:clrMapOvr>
@@ -12798,7 +13500,7 @@
   <p:cSld>
     <p:spTree>
       <p:nvGrpSpPr>
-        <p:cNvPr id="186" name="Shape 186"/>
+        <p:cNvPr id="187" name="Shape 187"/>
         <p:cNvGrpSpPr/>
         <p:nvPr/>
       </p:nvGrpSpPr>
@@ -12812,7 +13514,7 @@
       </p:grpSpPr>
       <p:sp>
         <p:nvSpPr>
-          <p:cNvPr id="187" name="Google Shape;187;p21"/>
+          <p:cNvPr id="188" name="Google Shape;188;p21"/>
           <p:cNvSpPr txBox="1"/>
           <p:nvPr>
             <p:ph type="title"/>
@@ -12829,7 +13531,7 @@
         </p:spPr>
         <p:txBody>
           <a:bodyPr anchorCtr="0" anchor="t" bIns="91425" lIns="91425" spcFirstLastPara="1" rIns="91425" wrap="square" tIns="91425">
-            <a:normAutofit/>
+            <a:normAutofit fontScale="90000"/>
           </a:bodyPr>
           <a:lstStyle/>
           <a:p>
@@ -12844,88 +13546,14 @@
             </a:pPr>
             <a:r>
               <a:rPr lang="es"/>
-              <a:t>Tecnologías de Desarrollo</a:t>
-            </a:r>
-            <a:endParaRPr/>
-          </a:p>
-        </p:txBody>
-      </p:sp>
-      <p:sp>
-        <p:nvSpPr>
-          <p:cNvPr id="188" name="Google Shape;188;p21"/>
-          <p:cNvSpPr txBox="1"/>
-          <p:nvPr>
-            <p:ph idx="1" type="body"/>
-          </p:nvPr>
-        </p:nvSpPr>
-        <p:spPr>
-          <a:xfrm>
-            <a:off x="1297500" y="1567550"/>
-            <a:ext cx="2171700" cy="2911200"/>
-          </a:xfrm>
-          <a:prstGeom prst="rect">
-            <a:avLst/>
-          </a:prstGeom>
-        </p:spPr>
-        <p:txBody>
-          <a:bodyPr anchorCtr="0" anchor="t" bIns="91425" lIns="91425" spcFirstLastPara="1" rIns="91425" wrap="square" tIns="91425">
-            <a:normAutofit lnSpcReduction="10000"/>
-          </a:bodyPr>
-          <a:lstStyle/>
-          <a:p>
-            <a:pPr indent="0" lvl="0" marL="0" rtl="0" algn="l">
-              <a:spcBef>
-                <a:spcPts val="0"/>
-              </a:spcBef>
-              <a:spcAft>
-                <a:spcPts val="0"/>
-              </a:spcAft>
-              <a:buNone/>
-            </a:pPr>
-            <a:r>
-              <a:rPr lang="es"/>
-              <a:t>Frontend:</a:t>
-            </a:r>
-            <a:endParaRPr/>
-          </a:p>
-          <a:p>
-            <a:pPr indent="-311150" lvl="0" marL="457200" rtl="0" algn="l">
-              <a:spcBef>
-                <a:spcPts val="1200"/>
-              </a:spcBef>
-              <a:spcAft>
-                <a:spcPts val="0"/>
-              </a:spcAft>
-              <a:buSzPts val="1300"/>
-              <a:buChar char="-"/>
-            </a:pPr>
-            <a:r>
-              <a:rPr lang="es"/>
-              <a:t>Angular v20</a:t>
-            </a:r>
-            <a:endParaRPr/>
-          </a:p>
-          <a:p>
-            <a:pPr indent="-311150" lvl="0" marL="457200" rtl="0" algn="l">
-              <a:spcBef>
-                <a:spcPts val="0"/>
-              </a:spcBef>
-              <a:spcAft>
-                <a:spcPts val="0"/>
-              </a:spcAft>
-              <a:buSzPts val="1300"/>
-              <a:buChar char="-"/>
-            </a:pPr>
-            <a:r>
-              <a:rPr lang="es"/>
-              <a:t>Tailwind Css</a:t>
+              <a:t>Diseño del sistema - Diagrama Actividades</a:t>
             </a:r>
             <a:endParaRPr/>
           </a:p>
           <a:p>
             <a:pPr indent="0" lvl="0" marL="0" rtl="0" algn="l">
               <a:spcBef>
-                <a:spcPts val="1200"/>
+                <a:spcPts val="0"/>
               </a:spcBef>
               <a:spcAft>
                 <a:spcPts val="0"/>
@@ -12933,102 +13561,7 @@
               <a:buNone/>
             </a:pPr>
             <a:r>
-              <a:rPr lang="es"/>
-              <a:t>Backend:</a:t>
-            </a:r>
-            <a:endParaRPr/>
-          </a:p>
-          <a:p>
-            <a:pPr indent="-311150" lvl="0" marL="457200" rtl="0" algn="l">
-              <a:spcBef>
-                <a:spcPts val="1200"/>
-              </a:spcBef>
-              <a:spcAft>
-                <a:spcPts val="0"/>
-              </a:spcAft>
-              <a:buSzPts val="1300"/>
-              <a:buChar char="-"/>
-            </a:pPr>
-            <a:r>
-              <a:rPr lang="es" u="sng">
-                <a:solidFill>
-                  <a:schemeClr val="hlink"/>
-                </a:solidFill>
-                <a:hlinkClick r:id="rId3"/>
-              </a:rPr>
-              <a:t>Node.js</a:t>
-            </a:r>
-            <a:endParaRPr/>
-          </a:p>
-          <a:p>
-            <a:pPr indent="-311150" lvl="0" marL="457200" rtl="0" algn="l">
-              <a:spcBef>
-                <a:spcPts val="0"/>
-              </a:spcBef>
-              <a:spcAft>
-                <a:spcPts val="0"/>
-              </a:spcAft>
-              <a:buSzPts val="1300"/>
-              <a:buChar char="-"/>
-            </a:pPr>
-            <a:r>
-              <a:rPr lang="es" u="sng">
-                <a:solidFill>
-                  <a:schemeClr val="hlink"/>
-                </a:solidFill>
-                <a:hlinkClick r:id="rId4"/>
-              </a:rPr>
-              <a:t>Express.js</a:t>
-            </a:r>
-            <a:endParaRPr/>
-          </a:p>
-          <a:p>
-            <a:pPr indent="-311150" lvl="0" marL="457200" rtl="0" algn="l">
-              <a:spcBef>
-                <a:spcPts val="0"/>
-              </a:spcBef>
-              <a:spcAft>
-                <a:spcPts val="0"/>
-              </a:spcAft>
-              <a:buSzPts val="1300"/>
-              <a:buChar char="-"/>
-            </a:pPr>
-            <a:r>
-              <a:rPr lang="es"/>
-              <a:t>Prisma</a:t>
-            </a:r>
-            <a:endParaRPr/>
-          </a:p>
-          <a:p>
-            <a:pPr indent="0" lvl="0" marL="0" rtl="0" algn="l">
-              <a:spcBef>
-                <a:spcPts val="1200"/>
-              </a:spcBef>
-              <a:spcAft>
-                <a:spcPts val="0"/>
-              </a:spcAft>
-              <a:buNone/>
-            </a:pPr>
-            <a:r>
-              <a:rPr lang="es"/>
-              <a:t>Bases de datos:</a:t>
-            </a:r>
-            <a:endParaRPr/>
-          </a:p>
-          <a:p>
-            <a:pPr indent="-311150" lvl="0" marL="457200" rtl="0" algn="l">
-              <a:spcBef>
-                <a:spcPts val="1200"/>
-              </a:spcBef>
-              <a:spcAft>
-                <a:spcPts val="0"/>
-              </a:spcAft>
-              <a:buSzPts val="1300"/>
-              <a:buChar char="-"/>
-            </a:pPr>
-            <a:r>
-              <a:rPr lang="es"/>
-              <a:t>PostgreSQL</a:t>
+              <a:t/>
             </a:r>
             <a:endParaRPr/>
           </a:p>
@@ -13044,8 +13577,8 @@
         </p:nvSpPr>
         <p:spPr>
           <a:xfrm>
-            <a:off x="4795600" y="1665625"/>
-            <a:ext cx="2171700" cy="2911200"/>
+            <a:off x="1297500" y="1567550"/>
+            <a:ext cx="7038900" cy="2911200"/>
           </a:xfrm>
           <a:prstGeom prst="rect">
             <a:avLst/>
@@ -13062,39 +13595,6 @@
                 <a:spcPts val="0"/>
               </a:spcBef>
               <a:spcAft>
-                <a:spcPts val="0"/>
-              </a:spcAft>
-              <a:buNone/>
-            </a:pPr>
-            <a:r>
-              <a:rPr lang="es"/>
-              <a:t>Control de versionamiento</a:t>
-            </a:r>
-            <a:endParaRPr/>
-          </a:p>
-          <a:p>
-            <a:pPr indent="-311150" lvl="0" marL="457200" rtl="0" algn="l">
-              <a:spcBef>
-                <a:spcPts val="1200"/>
-              </a:spcBef>
-              <a:spcAft>
-                <a:spcPts val="0"/>
-              </a:spcAft>
-              <a:buSzPts val="1300"/>
-              <a:buChar char="-"/>
-            </a:pPr>
-            <a:r>
-              <a:rPr lang="es"/>
-              <a:t>Git &amp; GitHub</a:t>
-            </a:r>
-            <a:endParaRPr/>
-          </a:p>
-          <a:p>
-            <a:pPr indent="0" lvl="0" marL="0" rtl="0" algn="l">
-              <a:spcBef>
-                <a:spcPts val="1200"/>
-              </a:spcBef>
-              <a:spcAft>
                 <a:spcPts val="1200"/>
               </a:spcAft>
               <a:buNone/>
@@ -13106,6 +13606,34 @@
           </a:p>
         </p:txBody>
       </p:sp>
+      <p:pic>
+        <p:nvPicPr>
+          <p:cNvPr id="190" name="Google Shape;190;p21" title="Agenda de visitas y configuración de recordatorios.png"/>
+          <p:cNvPicPr preferRelativeResize="0"/>
+          <p:nvPr/>
+        </p:nvPicPr>
+        <p:blipFill>
+          <a:blip r:embed="rId3">
+            <a:alphaModFix/>
+          </a:blip>
+          <a:stretch>
+            <a:fillRect/>
+          </a:stretch>
+        </p:blipFill>
+        <p:spPr>
+          <a:xfrm>
+            <a:off x="1106825" y="935925"/>
+            <a:ext cx="7316475" cy="4207574"/>
+          </a:xfrm>
+          <a:prstGeom prst="rect">
+            <a:avLst/>
+          </a:prstGeom>
+          <a:noFill/>
+          <a:ln>
+            <a:noFill/>
+          </a:ln>
+        </p:spPr>
+      </p:pic>
     </p:spTree>
   </p:cSld>
   <p:clrMapOvr>

</xml_diff>